<commit_message>
user guide summary added
</commit_message>
<xml_diff>
--- a/Notes/User Guide Summary.pptx
+++ b/Notes/User Guide Summary.pptx
@@ -7,6 +7,12 @@
   <p:sldIdLst>
     <p:sldId id="256" r:id="rId2"/>
     <p:sldId id="257" r:id="rId3"/>
+    <p:sldId id="262" r:id="rId4"/>
+    <p:sldId id="258" r:id="rId5"/>
+    <p:sldId id="260" r:id="rId6"/>
+    <p:sldId id="261" r:id="rId7"/>
+    <p:sldId id="263" r:id="rId8"/>
+    <p:sldId id="259" r:id="rId9"/>
   </p:sldIdLst>
   <p:sldSz cx="12192000" cy="6858000"/>
   <p:notesSz cx="6858000" cy="9144000"/>
@@ -260,7 +266,7 @@
           <a:p>
             <a:fld id="{0A649532-567B-1D4B-9A19-8D20E8EE32DD}" type="datetimeFigureOut">
               <a:rPr lang="en-US" smtClean="0"/>
-              <a:t>11/8/23</a:t>
+              <a:t>11/9/23</a:t>
             </a:fld>
             <a:endParaRPr lang="en-US"/>
           </a:p>
@@ -458,7 +464,7 @@
           <a:p>
             <a:fld id="{0A649532-567B-1D4B-9A19-8D20E8EE32DD}" type="datetimeFigureOut">
               <a:rPr lang="en-US" smtClean="0"/>
-              <a:t>11/8/23</a:t>
+              <a:t>11/9/23</a:t>
             </a:fld>
             <a:endParaRPr lang="en-US"/>
           </a:p>
@@ -666,7 +672,7 @@
           <a:p>
             <a:fld id="{0A649532-567B-1D4B-9A19-8D20E8EE32DD}" type="datetimeFigureOut">
               <a:rPr lang="en-US" smtClean="0"/>
-              <a:t>11/8/23</a:t>
+              <a:t>11/9/23</a:t>
             </a:fld>
             <a:endParaRPr lang="en-US"/>
           </a:p>
@@ -864,7 +870,7 @@
           <a:p>
             <a:fld id="{0A649532-567B-1D4B-9A19-8D20E8EE32DD}" type="datetimeFigureOut">
               <a:rPr lang="en-US" smtClean="0"/>
-              <a:t>11/8/23</a:t>
+              <a:t>11/9/23</a:t>
             </a:fld>
             <a:endParaRPr lang="en-US"/>
           </a:p>
@@ -1139,7 +1145,7 @@
           <a:p>
             <a:fld id="{0A649532-567B-1D4B-9A19-8D20E8EE32DD}" type="datetimeFigureOut">
               <a:rPr lang="en-US" smtClean="0"/>
-              <a:t>11/8/23</a:t>
+              <a:t>11/9/23</a:t>
             </a:fld>
             <a:endParaRPr lang="en-US"/>
           </a:p>
@@ -1404,7 +1410,7 @@
           <a:p>
             <a:fld id="{0A649532-567B-1D4B-9A19-8D20E8EE32DD}" type="datetimeFigureOut">
               <a:rPr lang="en-US" smtClean="0"/>
-              <a:t>11/8/23</a:t>
+              <a:t>11/9/23</a:t>
             </a:fld>
             <a:endParaRPr lang="en-US"/>
           </a:p>
@@ -1816,7 +1822,7 @@
           <a:p>
             <a:fld id="{0A649532-567B-1D4B-9A19-8D20E8EE32DD}" type="datetimeFigureOut">
               <a:rPr lang="en-US" smtClean="0"/>
-              <a:t>11/8/23</a:t>
+              <a:t>11/9/23</a:t>
             </a:fld>
             <a:endParaRPr lang="en-US"/>
           </a:p>
@@ -1957,7 +1963,7 @@
           <a:p>
             <a:fld id="{0A649532-567B-1D4B-9A19-8D20E8EE32DD}" type="datetimeFigureOut">
               <a:rPr lang="en-US" smtClean="0"/>
-              <a:t>11/8/23</a:t>
+              <a:t>11/9/23</a:t>
             </a:fld>
             <a:endParaRPr lang="en-US"/>
           </a:p>
@@ -2070,7 +2076,7 @@
           <a:p>
             <a:fld id="{0A649532-567B-1D4B-9A19-8D20E8EE32DD}" type="datetimeFigureOut">
               <a:rPr lang="en-US" smtClean="0"/>
-              <a:t>11/8/23</a:t>
+              <a:t>11/9/23</a:t>
             </a:fld>
             <a:endParaRPr lang="en-US"/>
           </a:p>
@@ -2381,7 +2387,7 @@
           <a:p>
             <a:fld id="{0A649532-567B-1D4B-9A19-8D20E8EE32DD}" type="datetimeFigureOut">
               <a:rPr lang="en-US" smtClean="0"/>
-              <a:t>11/8/23</a:t>
+              <a:t>11/9/23</a:t>
             </a:fld>
             <a:endParaRPr lang="en-US"/>
           </a:p>
@@ -2669,7 +2675,7 @@
           <a:p>
             <a:fld id="{0A649532-567B-1D4B-9A19-8D20E8EE32DD}" type="datetimeFigureOut">
               <a:rPr lang="en-US" smtClean="0"/>
-              <a:t>11/8/23</a:t>
+              <a:t>11/9/23</a:t>
             </a:fld>
             <a:endParaRPr lang="en-US"/>
           </a:p>
@@ -2910,7 +2916,7 @@
           <a:p>
             <a:fld id="{0A649532-567B-1D4B-9A19-8D20E8EE32DD}" type="datetimeFigureOut">
               <a:rPr lang="en-US" smtClean="0"/>
-              <a:t>11/8/23</a:t>
+              <a:t>11/9/23</a:t>
             </a:fld>
             <a:endParaRPr lang="en-US"/>
           </a:p>
@@ -3424,6 +3430,36 @@
           <a:chExt cx="0" cy="0"/>
         </a:xfrm>
       </p:grpSpPr>
+      <p:pic>
+        <p:nvPicPr>
+          <p:cNvPr id="4" name="Picture 3">
+            <a:extLst>
+              <a:ext uri="{FF2B5EF4-FFF2-40B4-BE49-F238E27FC236}">
+                <a16:creationId xmlns:a16="http://schemas.microsoft.com/office/drawing/2014/main" id="{14D4F77A-ED6A-DE67-D498-05FE39087B26}"/>
+              </a:ext>
+            </a:extLst>
+          </p:cNvPr>
+          <p:cNvPicPr>
+            <a:picLocks noChangeAspect="1"/>
+          </p:cNvPicPr>
+          <p:nvPr/>
+        </p:nvPicPr>
+        <p:blipFill>
+          <a:blip r:embed="rId2"/>
+          <a:stretch>
+            <a:fillRect/>
+          </a:stretch>
+        </p:blipFill>
+        <p:spPr>
+          <a:xfrm>
+            <a:off x="2816780" y="455284"/>
+            <a:ext cx="9278035" cy="6104791"/>
+          </a:xfrm>
+          <a:prstGeom prst="rect">
+            <a:avLst/>
+          </a:prstGeom>
+        </p:spPr>
+      </p:pic>
       <p:sp>
         <p:nvSpPr>
           <p:cNvPr id="2" name="Title 1">
@@ -3440,37 +3476,22 @@
             <p:ph type="title"/>
           </p:nvPr>
         </p:nvSpPr>
-        <p:spPr/>
-        <p:txBody>
-          <a:bodyPr/>
-          <a:lstStyle/>
-          <a:p>
-            <a:endParaRPr lang="en-US"/>
-          </a:p>
-        </p:txBody>
-      </p:sp>
-      <p:sp>
-        <p:nvSpPr>
-          <p:cNvPr id="3" name="Content Placeholder 2">
-            <a:extLst>
-              <a:ext uri="{FF2B5EF4-FFF2-40B4-BE49-F238E27FC236}">
-                <a16:creationId xmlns:a16="http://schemas.microsoft.com/office/drawing/2014/main" id="{6F6AABD0-2456-DB5B-9FA7-904C6D66A475}"/>
-              </a:ext>
-            </a:extLst>
-          </p:cNvPr>
-          <p:cNvSpPr>
-            <a:spLocks noGrp="1"/>
-          </p:cNvSpPr>
-          <p:nvPr>
-            <p:ph idx="1"/>
-          </p:nvPr>
-        </p:nvSpPr>
-        <p:spPr/>
-        <p:txBody>
-          <a:bodyPr/>
-          <a:lstStyle/>
-          <a:p>
-            <a:endParaRPr lang="en-US"/>
+        <p:spPr>
+          <a:xfrm>
+            <a:off x="97185" y="455284"/>
+            <a:ext cx="3213574" cy="1325563"/>
+          </a:xfrm>
+        </p:spPr>
+        <p:txBody>
+          <a:bodyPr>
+            <a:normAutofit/>
+          </a:bodyPr>
+          <a:lstStyle/>
+          <a:p>
+            <a:r>
+              <a:rPr lang="en-US" sz="4000" dirty="0"/>
+              <a:t>DLPC900 Motherboard</a:t>
+            </a:r>
           </a:p>
         </p:txBody>
       </p:sp>
@@ -3478,6 +3499,905 @@
     <p:extLst>
       <p:ext uri="{BB962C8B-B14F-4D97-AF65-F5344CB8AC3E}">
         <p14:creationId xmlns:p14="http://schemas.microsoft.com/office/powerpoint/2010/main" val="4273737651"/>
+      </p:ext>
+    </p:extLst>
+  </p:cSld>
+  <p:clrMapOvr>
+    <a:masterClrMapping/>
+  </p:clrMapOvr>
+</p:sld>
+</file>
+
+<file path=ppt/slides/slide3.xml><?xml version="1.0" encoding="utf-8"?>
+<p:sld xmlns:a="http://schemas.openxmlformats.org/drawingml/2006/main" xmlns:r="http://schemas.openxmlformats.org/officeDocument/2006/relationships" xmlns:p="http://schemas.openxmlformats.org/presentationml/2006/main">
+  <p:cSld>
+    <p:spTree>
+      <p:nvGrpSpPr>
+        <p:cNvPr id="1" name=""/>
+        <p:cNvGrpSpPr/>
+        <p:nvPr/>
+      </p:nvGrpSpPr>
+      <p:grpSpPr>
+        <a:xfrm>
+          <a:off x="0" y="0"/>
+          <a:ext cx="0" cy="0"/>
+          <a:chOff x="0" y="0"/>
+          <a:chExt cx="0" cy="0"/>
+        </a:xfrm>
+      </p:grpSpPr>
+      <p:pic>
+        <p:nvPicPr>
+          <p:cNvPr id="4" name="Picture 3">
+            <a:extLst>
+              <a:ext uri="{FF2B5EF4-FFF2-40B4-BE49-F238E27FC236}">
+                <a16:creationId xmlns:a16="http://schemas.microsoft.com/office/drawing/2014/main" id="{E63131F2-A216-DF75-8AEC-B1FBAD680E53}"/>
+              </a:ext>
+            </a:extLst>
+          </p:cNvPr>
+          <p:cNvPicPr>
+            <a:picLocks noChangeAspect="1"/>
+          </p:cNvPicPr>
+          <p:nvPr/>
+        </p:nvPicPr>
+        <p:blipFill>
+          <a:blip r:embed="rId2"/>
+          <a:stretch>
+            <a:fillRect/>
+          </a:stretch>
+        </p:blipFill>
+        <p:spPr>
+          <a:xfrm>
+            <a:off x="4097223" y="44614"/>
+            <a:ext cx="8094777" cy="5326227"/>
+          </a:xfrm>
+          <a:prstGeom prst="rect">
+            <a:avLst/>
+          </a:prstGeom>
+        </p:spPr>
+      </p:pic>
+      <p:sp>
+        <p:nvSpPr>
+          <p:cNvPr id="3" name="Content Placeholder 2">
+            <a:extLst>
+              <a:ext uri="{FF2B5EF4-FFF2-40B4-BE49-F238E27FC236}">
+                <a16:creationId xmlns:a16="http://schemas.microsoft.com/office/drawing/2014/main" id="{385DE2FB-34D1-6085-87DD-8489F016F2FB}"/>
+              </a:ext>
+            </a:extLst>
+          </p:cNvPr>
+          <p:cNvSpPr>
+            <a:spLocks noGrp="1"/>
+          </p:cNvSpPr>
+          <p:nvPr>
+            <p:ph idx="1"/>
+          </p:nvPr>
+        </p:nvSpPr>
+        <p:spPr>
+          <a:xfrm>
+            <a:off x="231228" y="722038"/>
+            <a:ext cx="3502572" cy="5605190"/>
+          </a:xfrm>
+        </p:spPr>
+        <p:txBody>
+          <a:bodyPr>
+            <a:normAutofit/>
+          </a:bodyPr>
+          <a:lstStyle/>
+          <a:p>
+            <a:r>
+              <a:rPr lang="en-US" sz="2000" dirty="0"/>
+              <a:t>J8 – host USB input</a:t>
+            </a:r>
+          </a:p>
+          <a:p>
+            <a:r>
+              <a:rPr lang="en-US" sz="2000" dirty="0"/>
+              <a:t>J20 - 12V DC power input</a:t>
+            </a:r>
+          </a:p>
+          <a:p>
+            <a:r>
+              <a:rPr lang="en-US" sz="2000" dirty="0"/>
+              <a:t>J18, J19 – DMD connector</a:t>
+            </a:r>
+          </a:p>
+          <a:p>
+            <a:r>
+              <a:rPr lang="en-US" sz="2000" dirty="0"/>
+              <a:t>J1 – HDMI Input(</a:t>
+            </a:r>
+            <a:r>
+              <a:rPr lang="en-CA" sz="1400" b="0" i="0" dirty="0">
+                <a:effectLst/>
+                <a:latin typeface="Arial" panose="020B0604020202020204" pitchFamily="34" charset="0"/>
+              </a:rPr>
+              <a:t>Video input to Video Splitter FPGA and DLPC900 controllers. For Video or Video </a:t>
+            </a:r>
+            <a:br>
+              <a:rPr lang="en-CA" sz="1400" dirty="0"/>
+            </a:br>
+            <a:r>
+              <a:rPr lang="en-CA" sz="1400" b="0" i="0" dirty="0">
+                <a:effectLst/>
+                <a:latin typeface="Arial" panose="020B0604020202020204" pitchFamily="34" charset="0"/>
+              </a:rPr>
+              <a:t>Pattern inputs (primary)?</a:t>
+            </a:r>
+            <a:r>
+              <a:rPr lang="en-CA" sz="2000" b="0" i="0" dirty="0">
+                <a:effectLst/>
+                <a:latin typeface="Arial" panose="020B0604020202020204" pitchFamily="34" charset="0"/>
+              </a:rPr>
+              <a:t>)</a:t>
+            </a:r>
+          </a:p>
+          <a:p>
+            <a:endParaRPr lang="en-CA" sz="2000" dirty="0">
+              <a:latin typeface="Arial" panose="020B0604020202020204" pitchFamily="34" charset="0"/>
+            </a:endParaRPr>
+          </a:p>
+          <a:p>
+            <a:r>
+              <a:rPr lang="en-CA" sz="2000" dirty="0">
+                <a:latin typeface="Arial" panose="020B0604020202020204" pitchFamily="34" charset="0"/>
+              </a:rPr>
+              <a:t>D5 – FPGA </a:t>
+            </a:r>
+            <a:r>
+              <a:rPr lang="en-CA" sz="2000" dirty="0" err="1">
+                <a:latin typeface="Arial" panose="020B0604020202020204" pitchFamily="34" charset="0"/>
+              </a:rPr>
+              <a:t>init</a:t>
+            </a:r>
+            <a:r>
+              <a:rPr lang="en-CA" sz="2000" dirty="0">
+                <a:latin typeface="Arial" panose="020B0604020202020204" pitchFamily="34" charset="0"/>
+              </a:rPr>
+              <a:t> done</a:t>
+            </a:r>
+          </a:p>
+          <a:p>
+            <a:r>
+              <a:rPr lang="en-CA" sz="2000" dirty="0">
+                <a:latin typeface="Arial" panose="020B0604020202020204" pitchFamily="34" charset="0"/>
+              </a:rPr>
+              <a:t>D7 – Green </a:t>
+            </a:r>
+            <a:br>
+              <a:rPr lang="en-CA" sz="2000" dirty="0">
+                <a:latin typeface="Arial" panose="020B0604020202020204" pitchFamily="34" charset="0"/>
+              </a:rPr>
+            </a:br>
+            <a:r>
+              <a:rPr lang="en-CA" sz="2000" dirty="0">
+                <a:latin typeface="Arial" panose="020B0604020202020204" pitchFamily="34" charset="0"/>
+              </a:rPr>
+              <a:t>Heartbeat LED (</a:t>
+            </a:r>
+            <a:r>
+              <a:rPr lang="en-CA" sz="1400" b="0" i="0" dirty="0">
+                <a:effectLst/>
+                <a:latin typeface="Arial" panose="020B0604020202020204" pitchFamily="34" charset="0"/>
+              </a:rPr>
+              <a:t>When toggling indicates Primary DLPC900 controller is operating</a:t>
+            </a:r>
+            <a:r>
+              <a:rPr lang="en-CA" sz="2000" dirty="0">
+                <a:latin typeface="Arial" panose="020B0604020202020204" pitchFamily="34" charset="0"/>
+              </a:rPr>
+              <a:t>)</a:t>
+            </a:r>
+          </a:p>
+          <a:p>
+            <a:r>
+              <a:rPr lang="en-CA" sz="2000" dirty="0">
+                <a:latin typeface="Arial" panose="020B0604020202020204" pitchFamily="34" charset="0"/>
+              </a:rPr>
+              <a:t>D11 – 12V power LED</a:t>
+            </a:r>
+            <a:endParaRPr lang="en-US" sz="2000" dirty="0">
+              <a:latin typeface="Arial" panose="020B0604020202020204" pitchFamily="34" charset="0"/>
+            </a:endParaRPr>
+          </a:p>
+        </p:txBody>
+      </p:sp>
+    </p:spTree>
+    <p:extLst>
+      <p:ext uri="{BB962C8B-B14F-4D97-AF65-F5344CB8AC3E}">
+        <p14:creationId xmlns:p14="http://schemas.microsoft.com/office/powerpoint/2010/main" val="2691567071"/>
+      </p:ext>
+    </p:extLst>
+  </p:cSld>
+  <p:clrMapOvr>
+    <a:masterClrMapping/>
+  </p:clrMapOvr>
+</p:sld>
+</file>
+
+<file path=ppt/slides/slide4.xml><?xml version="1.0" encoding="utf-8"?>
+<p:sld xmlns:a="http://schemas.openxmlformats.org/drawingml/2006/main" xmlns:r="http://schemas.openxmlformats.org/officeDocument/2006/relationships" xmlns:p="http://schemas.openxmlformats.org/presentationml/2006/main">
+  <p:cSld>
+    <p:spTree>
+      <p:nvGrpSpPr>
+        <p:cNvPr id="1" name=""/>
+        <p:cNvGrpSpPr/>
+        <p:nvPr/>
+      </p:nvGrpSpPr>
+      <p:grpSpPr>
+        <a:xfrm>
+          <a:off x="0" y="0"/>
+          <a:ext cx="0" cy="0"/>
+          <a:chOff x="0" y="0"/>
+          <a:chExt cx="0" cy="0"/>
+        </a:xfrm>
+      </p:grpSpPr>
+      <p:pic>
+        <p:nvPicPr>
+          <p:cNvPr id="4" name="Picture 3">
+            <a:extLst>
+              <a:ext uri="{FF2B5EF4-FFF2-40B4-BE49-F238E27FC236}">
+                <a16:creationId xmlns:a16="http://schemas.microsoft.com/office/drawing/2014/main" id="{4742FAEF-9766-6C9B-EB79-DE678C4EA1F0}"/>
+              </a:ext>
+            </a:extLst>
+          </p:cNvPr>
+          <p:cNvPicPr>
+            <a:picLocks noChangeAspect="1"/>
+          </p:cNvPicPr>
+          <p:nvPr/>
+        </p:nvPicPr>
+        <p:blipFill>
+          <a:blip r:embed="rId2"/>
+          <a:stretch>
+            <a:fillRect/>
+          </a:stretch>
+        </p:blipFill>
+        <p:spPr>
+          <a:xfrm>
+            <a:off x="2768019" y="0"/>
+            <a:ext cx="7706996" cy="6858000"/>
+          </a:xfrm>
+          <a:prstGeom prst="rect">
+            <a:avLst/>
+          </a:prstGeom>
+        </p:spPr>
+      </p:pic>
+      <p:sp>
+        <p:nvSpPr>
+          <p:cNvPr id="2" name="Title 1">
+            <a:extLst>
+              <a:ext uri="{FF2B5EF4-FFF2-40B4-BE49-F238E27FC236}">
+                <a16:creationId xmlns:a16="http://schemas.microsoft.com/office/drawing/2014/main" id="{5964A619-57BD-8F51-F41D-948EFC355631}"/>
+              </a:ext>
+            </a:extLst>
+          </p:cNvPr>
+          <p:cNvSpPr>
+            <a:spLocks noGrp="1"/>
+          </p:cNvSpPr>
+          <p:nvPr>
+            <p:ph type="title"/>
+          </p:nvPr>
+        </p:nvSpPr>
+        <p:spPr>
+          <a:xfrm>
+            <a:off x="249620" y="396656"/>
+            <a:ext cx="3365938" cy="1325563"/>
+          </a:xfrm>
+        </p:spPr>
+        <p:txBody>
+          <a:bodyPr/>
+          <a:lstStyle/>
+          <a:p>
+            <a:r>
+              <a:rPr lang="en-US" dirty="0"/>
+              <a:t>After Being Assembled</a:t>
+            </a:r>
+          </a:p>
+        </p:txBody>
+      </p:sp>
+    </p:spTree>
+    <p:extLst>
+      <p:ext uri="{BB962C8B-B14F-4D97-AF65-F5344CB8AC3E}">
+        <p14:creationId xmlns:p14="http://schemas.microsoft.com/office/powerpoint/2010/main" val="3702295334"/>
+      </p:ext>
+    </p:extLst>
+  </p:cSld>
+  <p:clrMapOvr>
+    <a:masterClrMapping/>
+  </p:clrMapOvr>
+</p:sld>
+</file>
+
+<file path=ppt/slides/slide5.xml><?xml version="1.0" encoding="utf-8"?>
+<p:sld xmlns:a="http://schemas.openxmlformats.org/drawingml/2006/main" xmlns:r="http://schemas.openxmlformats.org/officeDocument/2006/relationships" xmlns:p="http://schemas.openxmlformats.org/presentationml/2006/main">
+  <p:cSld>
+    <p:spTree>
+      <p:nvGrpSpPr>
+        <p:cNvPr id="1" name=""/>
+        <p:cNvGrpSpPr/>
+        <p:nvPr/>
+      </p:nvGrpSpPr>
+      <p:grpSpPr>
+        <a:xfrm>
+          <a:off x="0" y="0"/>
+          <a:ext cx="0" cy="0"/>
+          <a:chOff x="0" y="0"/>
+          <a:chExt cx="0" cy="0"/>
+        </a:xfrm>
+      </p:grpSpPr>
+      <p:sp>
+        <p:nvSpPr>
+          <p:cNvPr id="2" name="Title 1">
+            <a:extLst>
+              <a:ext uri="{FF2B5EF4-FFF2-40B4-BE49-F238E27FC236}">
+                <a16:creationId xmlns:a16="http://schemas.microsoft.com/office/drawing/2014/main" id="{E39E3CFD-1ABC-7542-954B-72BF914CA7E2}"/>
+              </a:ext>
+            </a:extLst>
+          </p:cNvPr>
+          <p:cNvSpPr>
+            <a:spLocks noGrp="1"/>
+          </p:cNvSpPr>
+          <p:nvPr>
+            <p:ph type="title"/>
+          </p:nvPr>
+        </p:nvSpPr>
+        <p:spPr/>
+        <p:txBody>
+          <a:bodyPr/>
+          <a:lstStyle/>
+          <a:p>
+            <a:r>
+              <a:rPr lang="en-US" dirty="0"/>
+              <a:t>Fixation on Board</a:t>
+            </a:r>
+          </a:p>
+        </p:txBody>
+      </p:sp>
+      <p:pic>
+        <p:nvPicPr>
+          <p:cNvPr id="4" name="Content Placeholder 3">
+            <a:extLst>
+              <a:ext uri="{FF2B5EF4-FFF2-40B4-BE49-F238E27FC236}">
+                <a16:creationId xmlns:a16="http://schemas.microsoft.com/office/drawing/2014/main" id="{C794DF7B-F276-2E7E-F61E-851E4EB7816B}"/>
+              </a:ext>
+            </a:extLst>
+          </p:cNvPr>
+          <p:cNvPicPr>
+            <a:picLocks noGrp="1" noChangeAspect="1"/>
+          </p:cNvPicPr>
+          <p:nvPr>
+            <p:ph idx="1"/>
+          </p:nvPr>
+        </p:nvPicPr>
+        <p:blipFill>
+          <a:blip r:embed="rId2"/>
+          <a:stretch>
+            <a:fillRect/>
+          </a:stretch>
+        </p:blipFill>
+        <p:spPr>
+          <a:xfrm>
+            <a:off x="5343762" y="149744"/>
+            <a:ext cx="5439852" cy="6251559"/>
+          </a:xfrm>
+          <a:prstGeom prst="rect">
+            <a:avLst/>
+          </a:prstGeom>
+        </p:spPr>
+      </p:pic>
+    </p:spTree>
+    <p:extLst>
+      <p:ext uri="{BB962C8B-B14F-4D97-AF65-F5344CB8AC3E}">
+        <p14:creationId xmlns:p14="http://schemas.microsoft.com/office/powerpoint/2010/main" val="1316634207"/>
+      </p:ext>
+    </p:extLst>
+  </p:cSld>
+  <p:clrMapOvr>
+    <a:masterClrMapping/>
+  </p:clrMapOvr>
+</p:sld>
+</file>
+
+<file path=ppt/slides/slide6.xml><?xml version="1.0" encoding="utf-8"?>
+<p:sld xmlns:a="http://schemas.openxmlformats.org/drawingml/2006/main" xmlns:r="http://schemas.openxmlformats.org/officeDocument/2006/relationships" xmlns:p="http://schemas.openxmlformats.org/presentationml/2006/main">
+  <p:cSld>
+    <p:spTree>
+      <p:nvGrpSpPr>
+        <p:cNvPr id="1" name=""/>
+        <p:cNvGrpSpPr/>
+        <p:nvPr/>
+      </p:nvGrpSpPr>
+      <p:grpSpPr>
+        <a:xfrm>
+          <a:off x="0" y="0"/>
+          <a:ext cx="0" cy="0"/>
+          <a:chOff x="0" y="0"/>
+          <a:chExt cx="0" cy="0"/>
+        </a:xfrm>
+      </p:grpSpPr>
+      <p:sp>
+        <p:nvSpPr>
+          <p:cNvPr id="2" name="Title 1">
+            <a:extLst>
+              <a:ext uri="{FF2B5EF4-FFF2-40B4-BE49-F238E27FC236}">
+                <a16:creationId xmlns:a16="http://schemas.microsoft.com/office/drawing/2014/main" id="{879B9C0F-1880-2109-EED7-F2EF78E8FFED}"/>
+              </a:ext>
+            </a:extLst>
+          </p:cNvPr>
+          <p:cNvSpPr>
+            <a:spLocks noGrp="1"/>
+          </p:cNvSpPr>
+          <p:nvPr>
+            <p:ph type="title"/>
+          </p:nvPr>
+        </p:nvSpPr>
+        <p:spPr/>
+        <p:txBody>
+          <a:bodyPr/>
+          <a:lstStyle/>
+          <a:p>
+            <a:r>
+              <a:rPr lang="en-US" dirty="0"/>
+              <a:t>Incoming Angle of Laser</a:t>
+            </a:r>
+          </a:p>
+        </p:txBody>
+      </p:sp>
+      <p:sp>
+        <p:nvSpPr>
+          <p:cNvPr id="3" name="Content Placeholder 2">
+            <a:extLst>
+              <a:ext uri="{FF2B5EF4-FFF2-40B4-BE49-F238E27FC236}">
+                <a16:creationId xmlns:a16="http://schemas.microsoft.com/office/drawing/2014/main" id="{EDDC7782-DCCC-99FF-3FA8-93C201EAE9D9}"/>
+              </a:ext>
+            </a:extLst>
+          </p:cNvPr>
+          <p:cNvSpPr>
+            <a:spLocks noGrp="1"/>
+          </p:cNvSpPr>
+          <p:nvPr>
+            <p:ph idx="1"/>
+          </p:nvPr>
+        </p:nvSpPr>
+        <p:spPr/>
+        <p:txBody>
+          <a:bodyPr/>
+          <a:lstStyle/>
+          <a:p>
+            <a:r>
+              <a:rPr lang="en-US" dirty="0"/>
+              <a:t>Didn’t find exact angle info inside manual</a:t>
+            </a:r>
+          </a:p>
+          <a:p>
+            <a:r>
+              <a:rPr lang="en-US" dirty="0"/>
+              <a:t>Searched both online and on paper – should be 24 degrees</a:t>
+            </a:r>
+          </a:p>
+        </p:txBody>
+      </p:sp>
+    </p:spTree>
+    <p:extLst>
+      <p:ext uri="{BB962C8B-B14F-4D97-AF65-F5344CB8AC3E}">
+        <p14:creationId xmlns:p14="http://schemas.microsoft.com/office/powerpoint/2010/main" val="543818358"/>
+      </p:ext>
+    </p:extLst>
+  </p:cSld>
+  <p:clrMapOvr>
+    <a:masterClrMapping/>
+  </p:clrMapOvr>
+</p:sld>
+</file>
+
+<file path=ppt/slides/slide7.xml><?xml version="1.0" encoding="utf-8"?>
+<p:sld xmlns:a="http://schemas.openxmlformats.org/drawingml/2006/main" xmlns:r="http://schemas.openxmlformats.org/officeDocument/2006/relationships" xmlns:p="http://schemas.openxmlformats.org/presentationml/2006/main">
+  <p:cSld>
+    <p:spTree>
+      <p:nvGrpSpPr>
+        <p:cNvPr id="1" name=""/>
+        <p:cNvGrpSpPr/>
+        <p:nvPr/>
+      </p:nvGrpSpPr>
+      <p:grpSpPr>
+        <a:xfrm>
+          <a:off x="0" y="0"/>
+          <a:ext cx="0" cy="0"/>
+          <a:chOff x="0" y="0"/>
+          <a:chExt cx="0" cy="0"/>
+        </a:xfrm>
+      </p:grpSpPr>
+      <p:sp>
+        <p:nvSpPr>
+          <p:cNvPr id="2" name="Title 1">
+            <a:extLst>
+              <a:ext uri="{FF2B5EF4-FFF2-40B4-BE49-F238E27FC236}">
+                <a16:creationId xmlns:a16="http://schemas.microsoft.com/office/drawing/2014/main" id="{CEF30CC4-9848-D1D3-86E8-CCECDBD50957}"/>
+              </a:ext>
+            </a:extLst>
+          </p:cNvPr>
+          <p:cNvSpPr>
+            <a:spLocks noGrp="1"/>
+          </p:cNvSpPr>
+          <p:nvPr>
+            <p:ph type="title"/>
+          </p:nvPr>
+        </p:nvSpPr>
+        <p:spPr/>
+        <p:txBody>
+          <a:bodyPr/>
+          <a:lstStyle/>
+          <a:p>
+            <a:r>
+              <a:rPr lang="en-US" dirty="0"/>
+              <a:t>Quick Start</a:t>
+            </a:r>
+          </a:p>
+        </p:txBody>
+      </p:sp>
+      <p:sp>
+        <p:nvSpPr>
+          <p:cNvPr id="3" name="Content Placeholder 2">
+            <a:extLst>
+              <a:ext uri="{FF2B5EF4-FFF2-40B4-BE49-F238E27FC236}">
+                <a16:creationId xmlns:a16="http://schemas.microsoft.com/office/drawing/2014/main" id="{ED0F6F72-A54C-5A5A-E05E-7598E160509B}"/>
+              </a:ext>
+            </a:extLst>
+          </p:cNvPr>
+          <p:cNvSpPr>
+            <a:spLocks noGrp="1"/>
+          </p:cNvSpPr>
+          <p:nvPr>
+            <p:ph idx="1"/>
+          </p:nvPr>
+        </p:nvSpPr>
+        <p:spPr>
+          <a:xfrm>
+            <a:off x="838200" y="1436741"/>
+            <a:ext cx="10515600" cy="4806403"/>
+          </a:xfrm>
+        </p:spPr>
+        <p:txBody>
+          <a:bodyPr>
+            <a:normAutofit/>
+          </a:bodyPr>
+          <a:lstStyle/>
+          <a:p>
+            <a:pPr marL="514350" indent="-514350">
+              <a:buAutoNum type="arabicPeriod"/>
+            </a:pPr>
+            <a:r>
+              <a:rPr lang="en-CA" sz="1800" b="0" i="0" dirty="0">
+                <a:effectLst/>
+                <a:latin typeface="Arial" panose="020B0604020202020204" pitchFamily="34" charset="0"/>
+              </a:rPr>
+              <a:t>Connect a </a:t>
+            </a:r>
+            <a:r>
+              <a:rPr lang="en-CA" sz="1800" b="0" i="0" dirty="0">
+                <a:solidFill>
+                  <a:srgbClr val="FF0000"/>
+                </a:solidFill>
+                <a:effectLst/>
+                <a:latin typeface="Arial" panose="020B0604020202020204" pitchFamily="34" charset="0"/>
+              </a:rPr>
+              <a:t>12-V DC</a:t>
+            </a:r>
+            <a:r>
+              <a:rPr lang="en-CA" sz="1800" b="0" i="0" dirty="0">
+                <a:effectLst/>
+                <a:latin typeface="Arial" panose="020B0604020202020204" pitchFamily="34" charset="0"/>
+              </a:rPr>
+              <a:t> power supply to the power supply connector </a:t>
+            </a:r>
+            <a:r>
+              <a:rPr lang="en-CA" sz="1800" b="0" i="0" dirty="0">
+                <a:solidFill>
+                  <a:srgbClr val="FF0000"/>
+                </a:solidFill>
+                <a:effectLst/>
+                <a:latin typeface="Arial" panose="020B0604020202020204" pitchFamily="34" charset="0"/>
+              </a:rPr>
+              <a:t>J20</a:t>
+            </a:r>
+            <a:r>
+              <a:rPr lang="en-CA" sz="1800" b="0" i="0" dirty="0">
+                <a:effectLst/>
+                <a:latin typeface="Arial" panose="020B0604020202020204" pitchFamily="34" charset="0"/>
+              </a:rPr>
+              <a:t>. </a:t>
+            </a:r>
+          </a:p>
+          <a:p>
+            <a:pPr marL="514350" indent="-514350">
+              <a:buAutoNum type="arabicPeriod"/>
+            </a:pPr>
+            <a:r>
+              <a:rPr lang="en-CA" sz="1800" b="0" i="0" dirty="0">
+                <a:effectLst/>
+                <a:latin typeface="Arial" panose="020B0604020202020204" pitchFamily="34" charset="0"/>
+              </a:rPr>
+              <a:t>LEDs — D5, D11, and D12 light up green to indicate configuration and power is normal.</a:t>
+            </a:r>
+          </a:p>
+          <a:p>
+            <a:pPr marL="514350" indent="-514350">
+              <a:buAutoNum type="arabicPeriod"/>
+            </a:pPr>
+            <a:r>
+              <a:rPr lang="en-CA" sz="1800" b="0" i="0" dirty="0">
+                <a:effectLst/>
+                <a:latin typeface="Arial" panose="020B0604020202020204" pitchFamily="34" charset="0"/>
+              </a:rPr>
+              <a:t>LEDs — D7 and D9 toggle on and off, indicating the DLPC900 controllers are operating normally.</a:t>
+            </a:r>
+          </a:p>
+          <a:p>
+            <a:pPr marL="514350" indent="-514350">
+              <a:buAutoNum type="arabicPeriod"/>
+            </a:pPr>
+            <a:r>
+              <a:rPr lang="en-CA" sz="1800" b="0" i="0" dirty="0">
+                <a:effectLst/>
+                <a:latin typeface="Arial" panose="020B0604020202020204" pitchFamily="34" charset="0"/>
+              </a:rPr>
+              <a:t>After 5 seconds, the two DLPC900 devices start sending a built-in rotating pattern sequence of images to the DMD for display on the DMD.</a:t>
+            </a:r>
+          </a:p>
+          <a:p>
+            <a:pPr marL="514350" indent="-514350">
+              <a:buAutoNum type="arabicPeriod"/>
+            </a:pPr>
+            <a:r>
+              <a:rPr lang="en-CA" sz="1800" b="0" i="0" dirty="0">
+                <a:effectLst/>
+                <a:latin typeface="Arial" panose="020B0604020202020204" pitchFamily="34" charset="0"/>
+              </a:rPr>
+              <a:t>Connect a </a:t>
+            </a:r>
+            <a:r>
+              <a:rPr lang="en-CA" sz="1800" b="0" i="0" dirty="0">
+                <a:solidFill>
+                  <a:srgbClr val="FF0000"/>
+                </a:solidFill>
+                <a:effectLst/>
+                <a:latin typeface="Arial" panose="020B0604020202020204" pitchFamily="34" charset="0"/>
+              </a:rPr>
+              <a:t>USB cable from a PC </a:t>
+            </a:r>
+            <a:r>
+              <a:rPr lang="en-CA" sz="1800" b="0" i="0" dirty="0">
+                <a:effectLst/>
+                <a:latin typeface="Arial" panose="020B0604020202020204" pitchFamily="34" charset="0"/>
+              </a:rPr>
+              <a:t>to connector </a:t>
+            </a:r>
+            <a:r>
+              <a:rPr lang="en-CA" sz="1800" b="0" i="0" dirty="0">
+                <a:solidFill>
+                  <a:srgbClr val="FF0000"/>
+                </a:solidFill>
+                <a:effectLst/>
+                <a:latin typeface="Arial" panose="020B0604020202020204" pitchFamily="34" charset="0"/>
+              </a:rPr>
+              <a:t>J8</a:t>
+            </a:r>
+            <a:r>
+              <a:rPr lang="en-CA" sz="1800" b="0" i="0" dirty="0">
+                <a:effectLst/>
+                <a:latin typeface="Arial" panose="020B0604020202020204" pitchFamily="34" charset="0"/>
+              </a:rPr>
+              <a:t> on the DLP </a:t>
+            </a:r>
+            <a:r>
+              <a:rPr lang="en-CA" sz="1800" b="0" i="0" dirty="0" err="1">
+                <a:effectLst/>
+                <a:latin typeface="Arial" panose="020B0604020202020204" pitchFamily="34" charset="0"/>
+              </a:rPr>
+              <a:t>LightCrafter</a:t>
+            </a:r>
+            <a:r>
+              <a:rPr lang="en-CA" sz="1800" b="0" i="0" dirty="0">
+                <a:effectLst/>
+                <a:latin typeface="Arial" panose="020B0604020202020204" pitchFamily="34" charset="0"/>
+              </a:rPr>
+              <a:t> Dual DLPC900 EVM. The first time the cable is connected on a PC, the DLP </a:t>
+            </a:r>
+            <a:r>
+              <a:rPr lang="en-CA" sz="1800" b="0" i="0" dirty="0" err="1">
+                <a:effectLst/>
+                <a:latin typeface="Arial" panose="020B0604020202020204" pitchFamily="34" charset="0"/>
+              </a:rPr>
+              <a:t>LightCrafter</a:t>
+            </a:r>
+            <a:r>
+              <a:rPr lang="en-CA" sz="1800" b="0" i="0" dirty="0">
+                <a:effectLst/>
+                <a:latin typeface="Arial" panose="020B0604020202020204" pitchFamily="34" charset="0"/>
+              </a:rPr>
+              <a:t> Dual DLPC900 EVM enumerates as a USB composite device with human-interface device (HID) class. No drivers are required since these are natively handled by all operating systems.</a:t>
+            </a:r>
+          </a:p>
+          <a:p>
+            <a:pPr marL="514350" indent="-514350">
+              <a:buAutoNum type="arabicPeriod"/>
+            </a:pPr>
+            <a:r>
+              <a:rPr lang="en-CA" sz="1800" b="0" i="0" dirty="0">
+                <a:effectLst/>
+                <a:latin typeface="Arial" panose="020B0604020202020204" pitchFamily="34" charset="0"/>
+              </a:rPr>
+              <a:t>The DLP </a:t>
+            </a:r>
+            <a:r>
+              <a:rPr lang="en-CA" sz="1800" b="0" i="0" dirty="0" err="1">
+                <a:effectLst/>
+                <a:latin typeface="Arial" panose="020B0604020202020204" pitchFamily="34" charset="0"/>
+              </a:rPr>
+              <a:t>LightCrafter</a:t>
+            </a:r>
+            <a:r>
+              <a:rPr lang="en-CA" sz="1800" b="0" i="0" dirty="0">
+                <a:effectLst/>
+                <a:latin typeface="Arial" panose="020B0604020202020204" pitchFamily="34" charset="0"/>
+              </a:rPr>
+              <a:t> Dual DLPC900 EVM can be controlled with the free GUI software and firmware versions available for download from DLPLCRC900DEVM</a:t>
+            </a:r>
+            <a:br>
+              <a:rPr lang="en-CA" sz="1800" b="0" i="0" dirty="0">
+                <a:effectLst/>
+                <a:latin typeface="Arial" panose="020B0604020202020204" pitchFamily="34" charset="0"/>
+              </a:rPr>
+            </a:br>
+            <a:endParaRPr lang="en-US" sz="1800" dirty="0"/>
+          </a:p>
+        </p:txBody>
+      </p:sp>
+    </p:spTree>
+    <p:extLst>
+      <p:ext uri="{BB962C8B-B14F-4D97-AF65-F5344CB8AC3E}">
+        <p14:creationId xmlns:p14="http://schemas.microsoft.com/office/powerpoint/2010/main" val="4151352302"/>
+      </p:ext>
+    </p:extLst>
+  </p:cSld>
+  <p:clrMapOvr>
+    <a:masterClrMapping/>
+  </p:clrMapOvr>
+</p:sld>
+</file>
+
+<file path=ppt/slides/slide8.xml><?xml version="1.0" encoding="utf-8"?>
+<p:sld xmlns:a="http://schemas.openxmlformats.org/drawingml/2006/main" xmlns:r="http://schemas.openxmlformats.org/officeDocument/2006/relationships" xmlns:p="http://schemas.openxmlformats.org/presentationml/2006/main">
+  <p:cSld>
+    <p:spTree>
+      <p:nvGrpSpPr>
+        <p:cNvPr id="1" name=""/>
+        <p:cNvGrpSpPr/>
+        <p:nvPr/>
+      </p:nvGrpSpPr>
+      <p:grpSpPr>
+        <a:xfrm>
+          <a:off x="0" y="0"/>
+          <a:ext cx="0" cy="0"/>
+          <a:chOff x="0" y="0"/>
+          <a:chExt cx="0" cy="0"/>
+        </a:xfrm>
+      </p:grpSpPr>
+      <p:sp>
+        <p:nvSpPr>
+          <p:cNvPr id="2" name="Title 1">
+            <a:extLst>
+              <a:ext uri="{FF2B5EF4-FFF2-40B4-BE49-F238E27FC236}">
+                <a16:creationId xmlns:a16="http://schemas.microsoft.com/office/drawing/2014/main" id="{97D30691-21B1-5923-703B-A246B809BCB2}"/>
+              </a:ext>
+            </a:extLst>
+          </p:cNvPr>
+          <p:cNvSpPr>
+            <a:spLocks noGrp="1"/>
+          </p:cNvSpPr>
+          <p:nvPr>
+            <p:ph type="title"/>
+          </p:nvPr>
+        </p:nvSpPr>
+        <p:spPr/>
+        <p:txBody>
+          <a:bodyPr/>
+          <a:lstStyle/>
+          <a:p>
+            <a:r>
+              <a:rPr lang="en-US" dirty="0"/>
+              <a:t>Intro Videos for Software</a:t>
+            </a:r>
+          </a:p>
+        </p:txBody>
+      </p:sp>
+      <p:sp>
+        <p:nvSpPr>
+          <p:cNvPr id="3" name="Content Placeholder 2">
+            <a:extLst>
+              <a:ext uri="{FF2B5EF4-FFF2-40B4-BE49-F238E27FC236}">
+                <a16:creationId xmlns:a16="http://schemas.microsoft.com/office/drawing/2014/main" id="{CE471F8A-FB8B-F474-6F99-857ADA2250CB}"/>
+              </a:ext>
+            </a:extLst>
+          </p:cNvPr>
+          <p:cNvSpPr>
+            <a:spLocks noGrp="1"/>
+          </p:cNvSpPr>
+          <p:nvPr>
+            <p:ph idx="1"/>
+          </p:nvPr>
+        </p:nvSpPr>
+        <p:spPr/>
+        <p:txBody>
+          <a:bodyPr/>
+          <a:lstStyle/>
+          <a:p>
+            <a:r>
+              <a:rPr lang="en-CA" b="1" i="0" dirty="0">
+                <a:effectLst/>
+                <a:latin typeface="YouTube Sans"/>
+                <a:hlinkClick r:id="rId2"/>
+              </a:rPr>
+              <a:t>Getting started: TI DLP® </a:t>
+            </a:r>
+            <a:r>
+              <a:rPr lang="en-CA" b="1" i="0" dirty="0" err="1">
+                <a:effectLst/>
+                <a:latin typeface="YouTube Sans"/>
+                <a:hlinkClick r:id="rId2"/>
+              </a:rPr>
+              <a:t>LightCrafter</a:t>
+            </a:r>
+            <a:r>
+              <a:rPr lang="en-CA" b="1" i="0" dirty="0">
+                <a:effectLst/>
+                <a:latin typeface="YouTube Sans"/>
+                <a:hlinkClick r:id="rId2"/>
+              </a:rPr>
+              <a:t>™ 6500 and 9000 EVMs</a:t>
+            </a:r>
+            <a:endParaRPr lang="en-CA" b="1" i="0" dirty="0">
+              <a:effectLst/>
+              <a:latin typeface="YouTube Sans"/>
+            </a:endParaRPr>
+          </a:p>
+          <a:p>
+            <a:r>
+              <a:rPr lang="en-CA" b="1" i="0" dirty="0">
+                <a:effectLst/>
+                <a:latin typeface="YouTube Sans"/>
+                <a:hlinkClick r:id="rId3"/>
+              </a:rPr>
+              <a:t>Getting started: TI DLP® </a:t>
+            </a:r>
+            <a:r>
+              <a:rPr lang="en-CA" b="1" i="0" dirty="0" err="1">
+                <a:effectLst/>
+                <a:latin typeface="YouTube Sans"/>
+                <a:hlinkClick r:id="rId3"/>
+              </a:rPr>
+              <a:t>LightCrafter</a:t>
+            </a:r>
+            <a:r>
+              <a:rPr lang="en-CA" b="1" i="0" dirty="0">
+                <a:effectLst/>
+                <a:latin typeface="YouTube Sans"/>
+                <a:hlinkClick r:id="rId3"/>
+              </a:rPr>
+              <a:t>™ 6500 &amp; 9000 EVMs Pt 2</a:t>
+            </a:r>
+            <a:endParaRPr lang="en-CA" b="1" i="0" dirty="0">
+              <a:effectLst/>
+              <a:latin typeface="YouTube Sans"/>
+            </a:endParaRPr>
+          </a:p>
+          <a:p>
+            <a:endParaRPr lang="en-US" dirty="0"/>
+          </a:p>
+        </p:txBody>
+      </p:sp>
+    </p:spTree>
+    <p:extLst>
+      <p:ext uri="{BB962C8B-B14F-4D97-AF65-F5344CB8AC3E}">
+        <p14:creationId xmlns:p14="http://schemas.microsoft.com/office/powerpoint/2010/main" val="4038855851"/>
       </p:ext>
     </p:extLst>
   </p:cSld>

</xml_diff>